<commit_message>
Changed unity and presentation
</commit_message>
<xml_diff>
--- a/Managment/Presentations/Final Power Point Presentation.pptx
+++ b/Managment/Presentations/Final Power Point Presentation.pptx
@@ -20,9 +20,9 @@
     <p:sldId id="265" r:id="rId11"/>
     <p:sldId id="266" r:id="rId12"/>
     <p:sldId id="268" r:id="rId13"/>
-    <p:sldId id="269" r:id="rId14"/>
-    <p:sldId id="270" r:id="rId15"/>
-    <p:sldId id="271" r:id="rId16"/>
+    <p:sldId id="273" r:id="rId14"/>
+    <p:sldId id="269" r:id="rId15"/>
+    <p:sldId id="270" r:id="rId16"/>
     <p:sldId id="272" r:id="rId17"/>
   </p:sldIdLst>
   <p:sldSz cx="12192000" cy="6858000"/>
@@ -122,7 +122,859 @@
       </a:defRPr>
     </a:lvl9pPr>
   </p:defaultTextStyle>
+  <p:extLst>
+    <p:ext uri="{EFAFB233-063F-42B5-8137-9DF3F51BA10A}">
+      <p15:sldGuideLst xmlns:p15="http://schemas.microsoft.com/office/powerpoint/2012/main"/>
+    </p:ext>
+  </p:extLst>
 </p:presentation>
+</file>
+
+<file path=ppt/charts/chart1.xml><?xml version="1.0" encoding="utf-8"?>
+<c:chartSpace xmlns:c="http://schemas.openxmlformats.org/drawingml/2006/chart" xmlns:a="http://schemas.openxmlformats.org/drawingml/2006/main" xmlns:r="http://schemas.openxmlformats.org/officeDocument/2006/relationships" xmlns:c16r2="http://schemas.microsoft.com/office/drawing/2015/06/chart">
+  <c:date1904 val="0"/>
+  <c:lang val="en-US"/>
+  <c:roundedCorners val="0"/>
+  <mc:AlternateContent xmlns:mc="http://schemas.openxmlformats.org/markup-compatibility/2006">
+    <mc:Choice xmlns:c14="http://schemas.microsoft.com/office/drawing/2007/8/2/chart" Requires="c14">
+      <c14:style val="102"/>
+    </mc:Choice>
+    <mc:Fallback>
+      <c:style val="2"/>
+    </mc:Fallback>
+  </mc:AlternateContent>
+  <c:chart>
+    <c:title>
+      <c:tx>
+        <c:rich>
+          <a:bodyPr rot="0" spcFirstLastPara="1" vertOverflow="ellipsis" vert="horz" wrap="square" anchor="ctr" anchorCtr="1"/>
+          <a:lstStyle/>
+          <a:p>
+            <a:pPr>
+              <a:defRPr sz="1400" b="0" i="0" u="none" strike="noStrike" kern="1200" spc="0" baseline="0">
+                <a:solidFill>
+                  <a:schemeClr val="tx1">
+                    <a:lumMod val="65000"/>
+                    <a:lumOff val="35000"/>
+                  </a:schemeClr>
+                </a:solidFill>
+                <a:latin typeface="+mn-lt"/>
+                <a:ea typeface="+mn-ea"/>
+                <a:cs typeface="+mn-cs"/>
+              </a:defRPr>
+            </a:pPr>
+            <a:r>
+              <a:rPr lang="en-GB" dirty="0"/>
+              <a:t>Number of hours work done</a:t>
+            </a:r>
+          </a:p>
+        </c:rich>
+      </c:tx>
+      <c:overlay val="0"/>
+      <c:spPr>
+        <a:noFill/>
+        <a:ln>
+          <a:noFill/>
+        </a:ln>
+        <a:effectLst/>
+      </c:spPr>
+      <c:txPr>
+        <a:bodyPr rot="0" spcFirstLastPara="1" vertOverflow="ellipsis" vert="horz" wrap="square" anchor="ctr" anchorCtr="1"/>
+        <a:lstStyle/>
+        <a:p>
+          <a:pPr>
+            <a:defRPr sz="1400" b="0" i="0" u="none" strike="noStrike" kern="1200" spc="0" baseline="0">
+              <a:solidFill>
+                <a:schemeClr val="tx1">
+                  <a:lumMod val="65000"/>
+                  <a:lumOff val="35000"/>
+                </a:schemeClr>
+              </a:solidFill>
+              <a:latin typeface="+mn-lt"/>
+              <a:ea typeface="+mn-ea"/>
+              <a:cs typeface="+mn-cs"/>
+            </a:defRPr>
+          </a:pPr>
+          <a:endParaRPr lang="en-US"/>
+        </a:p>
+      </c:txPr>
+    </c:title>
+    <c:autoTitleDeleted val="0"/>
+    <c:plotArea>
+      <c:layout>
+        <c:manualLayout>
+          <c:layoutTarget val="inner"/>
+          <c:xMode val="edge"/>
+          <c:yMode val="edge"/>
+          <c:x val="6.6580927384076991E-2"/>
+          <c:y val="2.5428331875182269E-2"/>
+          <c:w val="0.90286351706036749"/>
+          <c:h val="0.72088764946048411"/>
+        </c:manualLayout>
+      </c:layout>
+      <c:barChart>
+        <c:barDir val="col"/>
+        <c:grouping val="clustered"/>
+        <c:varyColors val="0"/>
+        <c:ser>
+          <c:idx val="0"/>
+          <c:order val="0"/>
+          <c:spPr>
+            <a:solidFill>
+              <a:schemeClr val="tx1">
+                <a:lumMod val="85000"/>
+                <a:lumOff val="15000"/>
+              </a:schemeClr>
+            </a:solidFill>
+            <a:ln>
+              <a:noFill/>
+            </a:ln>
+            <a:effectLst/>
+          </c:spPr>
+          <c:invertIfNegative val="0"/>
+          <c:cat>
+            <c:strRef>
+              <c:f>Sheet1!$D$2:$D$5</c:f>
+              <c:strCache>
+                <c:ptCount val="4"/>
+                <c:pt idx="0">
+                  <c:v>Connor</c:v>
+                </c:pt>
+                <c:pt idx="1">
+                  <c:v>Callum</c:v>
+                </c:pt>
+                <c:pt idx="2">
+                  <c:v>Mac</c:v>
+                </c:pt>
+                <c:pt idx="3">
+                  <c:v>Jake</c:v>
+                </c:pt>
+              </c:strCache>
+            </c:strRef>
+          </c:cat>
+          <c:val>
+            <c:numRef>
+              <c:f>Sheet1!$E$2:$E$5</c:f>
+              <c:numCache>
+                <c:formatCode>General</c:formatCode>
+                <c:ptCount val="4"/>
+                <c:pt idx="0">
+                  <c:v>20</c:v>
+                </c:pt>
+                <c:pt idx="1">
+                  <c:v>12</c:v>
+                </c:pt>
+                <c:pt idx="2">
+                  <c:v>7</c:v>
+                </c:pt>
+                <c:pt idx="3">
+                  <c:v>0</c:v>
+                </c:pt>
+              </c:numCache>
+            </c:numRef>
+          </c:val>
+          <c:extLst>
+            <c:ext xmlns:c16="http://schemas.microsoft.com/office/drawing/2014/chart" uri="{C3380CC4-5D6E-409C-BE32-E72D297353CC}">
+              <c16:uniqueId val="{00000000-B726-47E9-BDA5-A88A621D250D}"/>
+            </c:ext>
+          </c:extLst>
+        </c:ser>
+        <c:dLbls>
+          <c:showLegendKey val="0"/>
+          <c:showVal val="0"/>
+          <c:showCatName val="0"/>
+          <c:showSerName val="0"/>
+          <c:showPercent val="0"/>
+          <c:showBubbleSize val="0"/>
+        </c:dLbls>
+        <c:gapWidth val="219"/>
+        <c:overlap val="-27"/>
+        <c:axId val="431593096"/>
+        <c:axId val="431594080"/>
+      </c:barChart>
+      <c:catAx>
+        <c:axId val="431593096"/>
+        <c:scaling>
+          <c:orientation val="minMax"/>
+        </c:scaling>
+        <c:delete val="0"/>
+        <c:axPos val="b"/>
+        <c:numFmt formatCode="General" sourceLinked="1"/>
+        <c:majorTickMark val="none"/>
+        <c:minorTickMark val="none"/>
+        <c:tickLblPos val="nextTo"/>
+        <c:spPr>
+          <a:noFill/>
+          <a:ln w="9525" cap="flat" cmpd="sng" algn="ctr">
+            <a:solidFill>
+              <a:schemeClr val="tx1">
+                <a:lumMod val="15000"/>
+                <a:lumOff val="85000"/>
+              </a:schemeClr>
+            </a:solidFill>
+            <a:round/>
+          </a:ln>
+          <a:effectLst/>
+        </c:spPr>
+        <c:txPr>
+          <a:bodyPr rot="-60000000" spcFirstLastPara="1" vertOverflow="ellipsis" vert="horz" wrap="square" anchor="ctr" anchorCtr="1"/>
+          <a:lstStyle/>
+          <a:p>
+            <a:pPr>
+              <a:defRPr sz="900" b="0" i="0" u="none" strike="noStrike" kern="1200" baseline="0">
+                <a:solidFill>
+                  <a:schemeClr val="tx1">
+                    <a:lumMod val="65000"/>
+                    <a:lumOff val="35000"/>
+                  </a:schemeClr>
+                </a:solidFill>
+                <a:latin typeface="+mn-lt"/>
+                <a:ea typeface="+mn-ea"/>
+                <a:cs typeface="+mn-cs"/>
+              </a:defRPr>
+            </a:pPr>
+            <a:endParaRPr lang="en-US"/>
+          </a:p>
+        </c:txPr>
+        <c:crossAx val="431594080"/>
+        <c:crosses val="autoZero"/>
+        <c:auto val="1"/>
+        <c:lblAlgn val="ctr"/>
+        <c:lblOffset val="100"/>
+        <c:noMultiLvlLbl val="0"/>
+      </c:catAx>
+      <c:valAx>
+        <c:axId val="431594080"/>
+        <c:scaling>
+          <c:orientation val="minMax"/>
+        </c:scaling>
+        <c:delete val="0"/>
+        <c:axPos val="l"/>
+        <c:majorGridlines>
+          <c:spPr>
+            <a:ln w="9525" cap="flat" cmpd="sng" algn="ctr">
+              <a:solidFill>
+                <a:schemeClr val="tx1">
+                  <a:lumMod val="15000"/>
+                  <a:lumOff val="85000"/>
+                </a:schemeClr>
+              </a:solidFill>
+              <a:round/>
+            </a:ln>
+            <a:effectLst/>
+          </c:spPr>
+        </c:majorGridlines>
+        <c:numFmt formatCode="General" sourceLinked="1"/>
+        <c:majorTickMark val="none"/>
+        <c:minorTickMark val="none"/>
+        <c:tickLblPos val="nextTo"/>
+        <c:spPr>
+          <a:noFill/>
+          <a:ln>
+            <a:noFill/>
+          </a:ln>
+          <a:effectLst/>
+        </c:spPr>
+        <c:txPr>
+          <a:bodyPr rot="-60000000" spcFirstLastPara="1" vertOverflow="ellipsis" vert="horz" wrap="square" anchor="ctr" anchorCtr="1"/>
+          <a:lstStyle/>
+          <a:p>
+            <a:pPr>
+              <a:defRPr sz="900" b="0" i="0" u="none" strike="noStrike" kern="1200" baseline="0">
+                <a:solidFill>
+                  <a:schemeClr val="tx1">
+                    <a:lumMod val="65000"/>
+                    <a:lumOff val="35000"/>
+                  </a:schemeClr>
+                </a:solidFill>
+                <a:latin typeface="+mn-lt"/>
+                <a:ea typeface="+mn-ea"/>
+                <a:cs typeface="+mn-cs"/>
+              </a:defRPr>
+            </a:pPr>
+            <a:endParaRPr lang="en-US"/>
+          </a:p>
+        </c:txPr>
+        <c:crossAx val="431593096"/>
+        <c:crosses val="autoZero"/>
+        <c:crossBetween val="between"/>
+      </c:valAx>
+      <c:spPr>
+        <a:noFill/>
+        <a:ln>
+          <a:noFill/>
+        </a:ln>
+        <a:effectLst/>
+      </c:spPr>
+    </c:plotArea>
+    <c:plotVisOnly val="1"/>
+    <c:dispBlanksAs val="gap"/>
+    <c:showDLblsOverMax val="0"/>
+  </c:chart>
+  <c:spPr>
+    <a:noFill/>
+    <a:ln>
+      <a:noFill/>
+    </a:ln>
+    <a:effectLst/>
+  </c:spPr>
+  <c:txPr>
+    <a:bodyPr/>
+    <a:lstStyle/>
+    <a:p>
+      <a:pPr>
+        <a:defRPr/>
+      </a:pPr>
+      <a:endParaRPr lang="en-US"/>
+    </a:p>
+  </c:txPr>
+  <c:externalData r:id="rId3">
+    <c:autoUpdate val="0"/>
+  </c:externalData>
+</c:chartSpace>
+</file>
+
+<file path=ppt/charts/colors1.xml><?xml version="1.0" encoding="utf-8"?>
+<cs:colorStyle xmlns:cs="http://schemas.microsoft.com/office/drawing/2012/chartStyle" xmlns:a="http://schemas.openxmlformats.org/drawingml/2006/main" meth="cycle" id="10">
+  <a:schemeClr val="accent1"/>
+  <a:schemeClr val="accent2"/>
+  <a:schemeClr val="accent3"/>
+  <a:schemeClr val="accent4"/>
+  <a:schemeClr val="accent5"/>
+  <a:schemeClr val="accent6"/>
+  <cs:variation/>
+  <cs:variation>
+    <a:lumMod val="60000"/>
+  </cs:variation>
+  <cs:variation>
+    <a:lumMod val="80000"/>
+    <a:lumOff val="20000"/>
+  </cs:variation>
+  <cs:variation>
+    <a:lumMod val="80000"/>
+  </cs:variation>
+  <cs:variation>
+    <a:lumMod val="60000"/>
+    <a:lumOff val="40000"/>
+  </cs:variation>
+  <cs:variation>
+    <a:lumMod val="50000"/>
+  </cs:variation>
+  <cs:variation>
+    <a:lumMod val="70000"/>
+    <a:lumOff val="30000"/>
+  </cs:variation>
+  <cs:variation>
+    <a:lumMod val="70000"/>
+  </cs:variation>
+  <cs:variation>
+    <a:lumMod val="50000"/>
+    <a:lumOff val="50000"/>
+  </cs:variation>
+</cs:colorStyle>
+</file>
+
+<file path=ppt/charts/style1.xml><?xml version="1.0" encoding="utf-8"?>
+<cs:chartStyle xmlns:cs="http://schemas.microsoft.com/office/drawing/2012/chartStyle" xmlns:a="http://schemas.openxmlformats.org/drawingml/2006/main" id="201">
+  <cs:axisTitle>
+    <cs:lnRef idx="0"/>
+    <cs:fillRef idx="0"/>
+    <cs:effectRef idx="0"/>
+    <cs:fontRef idx="minor">
+      <a:schemeClr val="tx1">
+        <a:lumMod val="65000"/>
+        <a:lumOff val="35000"/>
+      </a:schemeClr>
+    </cs:fontRef>
+    <cs:defRPr sz="1000" kern="1200"/>
+  </cs:axisTitle>
+  <cs:categoryAxis>
+    <cs:lnRef idx="0"/>
+    <cs:fillRef idx="0"/>
+    <cs:effectRef idx="0"/>
+    <cs:fontRef idx="minor">
+      <a:schemeClr val="tx1">
+        <a:lumMod val="65000"/>
+        <a:lumOff val="35000"/>
+      </a:schemeClr>
+    </cs:fontRef>
+    <cs:spPr>
+      <a:ln w="9525" cap="flat" cmpd="sng" algn="ctr">
+        <a:solidFill>
+          <a:schemeClr val="tx1">
+            <a:lumMod val="15000"/>
+            <a:lumOff val="85000"/>
+          </a:schemeClr>
+        </a:solidFill>
+        <a:round/>
+      </a:ln>
+    </cs:spPr>
+    <cs:defRPr sz="900" kern="1200"/>
+  </cs:categoryAxis>
+  <cs:chartArea mods="allowNoFillOverride allowNoLineOverride">
+    <cs:lnRef idx="0"/>
+    <cs:fillRef idx="0"/>
+    <cs:effectRef idx="0"/>
+    <cs:fontRef idx="minor">
+      <a:schemeClr val="tx1"/>
+    </cs:fontRef>
+    <cs:spPr>
+      <a:solidFill>
+        <a:schemeClr val="bg1"/>
+      </a:solidFill>
+      <a:ln w="9525" cap="flat" cmpd="sng" algn="ctr">
+        <a:solidFill>
+          <a:schemeClr val="tx1">
+            <a:lumMod val="15000"/>
+            <a:lumOff val="85000"/>
+          </a:schemeClr>
+        </a:solidFill>
+        <a:round/>
+      </a:ln>
+    </cs:spPr>
+    <cs:defRPr sz="1000" kern="1200"/>
+  </cs:chartArea>
+  <cs:dataLabel>
+    <cs:lnRef idx="0"/>
+    <cs:fillRef idx="0"/>
+    <cs:effectRef idx="0"/>
+    <cs:fontRef idx="minor">
+      <a:schemeClr val="tx1">
+        <a:lumMod val="75000"/>
+        <a:lumOff val="25000"/>
+      </a:schemeClr>
+    </cs:fontRef>
+    <cs:defRPr sz="900" kern="1200"/>
+  </cs:dataLabel>
+  <cs:dataLabelCallout>
+    <cs:lnRef idx="0"/>
+    <cs:fillRef idx="0"/>
+    <cs:effectRef idx="0"/>
+    <cs:fontRef idx="minor">
+      <a:schemeClr val="dk1">
+        <a:lumMod val="65000"/>
+        <a:lumOff val="35000"/>
+      </a:schemeClr>
+    </cs:fontRef>
+    <cs:spPr>
+      <a:solidFill>
+        <a:schemeClr val="lt1"/>
+      </a:solidFill>
+      <a:ln>
+        <a:solidFill>
+          <a:schemeClr val="dk1">
+            <a:lumMod val="25000"/>
+            <a:lumOff val="75000"/>
+          </a:schemeClr>
+        </a:solidFill>
+      </a:ln>
+    </cs:spPr>
+    <cs:defRPr sz="900" kern="1200"/>
+    <cs:bodyPr rot="0" spcFirstLastPara="1" vertOverflow="clip" horzOverflow="clip" vert="horz" wrap="square" lIns="36576" tIns="18288" rIns="36576" bIns="18288" anchor="ctr" anchorCtr="1">
+      <a:spAutoFit/>
+    </cs:bodyPr>
+  </cs:dataLabelCallout>
+  <cs:dataPoint>
+    <cs:lnRef idx="0"/>
+    <cs:fillRef idx="1">
+      <cs:styleClr val="auto"/>
+    </cs:fillRef>
+    <cs:effectRef idx="0"/>
+    <cs:fontRef idx="minor">
+      <a:schemeClr val="tx1"/>
+    </cs:fontRef>
+  </cs:dataPoint>
+  <cs:dataPoint3D>
+    <cs:lnRef idx="0"/>
+    <cs:fillRef idx="1">
+      <cs:styleClr val="auto"/>
+    </cs:fillRef>
+    <cs:effectRef idx="0"/>
+    <cs:fontRef idx="minor">
+      <a:schemeClr val="tx1"/>
+    </cs:fontRef>
+  </cs:dataPoint3D>
+  <cs:dataPointLine>
+    <cs:lnRef idx="0">
+      <cs:styleClr val="auto"/>
+    </cs:lnRef>
+    <cs:fillRef idx="1"/>
+    <cs:effectRef idx="0"/>
+    <cs:fontRef idx="minor">
+      <a:schemeClr val="tx1"/>
+    </cs:fontRef>
+    <cs:spPr>
+      <a:ln w="28575" cap="rnd">
+        <a:solidFill>
+          <a:schemeClr val="phClr"/>
+        </a:solidFill>
+        <a:round/>
+      </a:ln>
+    </cs:spPr>
+  </cs:dataPointLine>
+  <cs:dataPointMarker>
+    <cs:lnRef idx="0">
+      <cs:styleClr val="auto"/>
+    </cs:lnRef>
+    <cs:fillRef idx="1">
+      <cs:styleClr val="auto"/>
+    </cs:fillRef>
+    <cs:effectRef idx="0"/>
+    <cs:fontRef idx="minor">
+      <a:schemeClr val="tx1"/>
+    </cs:fontRef>
+    <cs:spPr>
+      <a:ln w="9525">
+        <a:solidFill>
+          <a:schemeClr val="phClr"/>
+        </a:solidFill>
+      </a:ln>
+    </cs:spPr>
+  </cs:dataPointMarker>
+  <cs:dataPointMarkerLayout symbol="circle" size="5"/>
+  <cs:dataPointWireframe>
+    <cs:lnRef idx="0">
+      <cs:styleClr val="auto"/>
+    </cs:lnRef>
+    <cs:fillRef idx="1"/>
+    <cs:effectRef idx="0"/>
+    <cs:fontRef idx="minor">
+      <a:schemeClr val="tx1"/>
+    </cs:fontRef>
+    <cs:spPr>
+      <a:ln w="9525" cap="rnd">
+        <a:solidFill>
+          <a:schemeClr val="phClr"/>
+        </a:solidFill>
+        <a:round/>
+      </a:ln>
+    </cs:spPr>
+  </cs:dataPointWireframe>
+  <cs:dataTable>
+    <cs:lnRef idx="0"/>
+    <cs:fillRef idx="0"/>
+    <cs:effectRef idx="0"/>
+    <cs:fontRef idx="minor">
+      <a:schemeClr val="tx1">
+        <a:lumMod val="65000"/>
+        <a:lumOff val="35000"/>
+      </a:schemeClr>
+    </cs:fontRef>
+    <cs:spPr>
+      <a:noFill/>
+      <a:ln w="9525" cap="flat" cmpd="sng" algn="ctr">
+        <a:solidFill>
+          <a:schemeClr val="tx1">
+            <a:lumMod val="15000"/>
+            <a:lumOff val="85000"/>
+          </a:schemeClr>
+        </a:solidFill>
+        <a:round/>
+      </a:ln>
+    </cs:spPr>
+    <cs:defRPr sz="900" kern="1200"/>
+  </cs:dataTable>
+  <cs:downBar>
+    <cs:lnRef idx="0"/>
+    <cs:fillRef idx="0"/>
+    <cs:effectRef idx="0"/>
+    <cs:fontRef idx="minor">
+      <a:schemeClr val="dk1"/>
+    </cs:fontRef>
+    <cs:spPr>
+      <a:solidFill>
+        <a:schemeClr val="dk1">
+          <a:lumMod val="65000"/>
+          <a:lumOff val="35000"/>
+        </a:schemeClr>
+      </a:solidFill>
+      <a:ln w="9525">
+        <a:solidFill>
+          <a:schemeClr val="tx1">
+            <a:lumMod val="65000"/>
+            <a:lumOff val="35000"/>
+          </a:schemeClr>
+        </a:solidFill>
+      </a:ln>
+    </cs:spPr>
+  </cs:downBar>
+  <cs:dropLine>
+    <cs:lnRef idx="0"/>
+    <cs:fillRef idx="0"/>
+    <cs:effectRef idx="0"/>
+    <cs:fontRef idx="minor">
+      <a:schemeClr val="tx1"/>
+    </cs:fontRef>
+    <cs:spPr>
+      <a:ln w="9525" cap="flat" cmpd="sng" algn="ctr">
+        <a:solidFill>
+          <a:schemeClr val="tx1">
+            <a:lumMod val="35000"/>
+            <a:lumOff val="65000"/>
+          </a:schemeClr>
+        </a:solidFill>
+        <a:round/>
+      </a:ln>
+    </cs:spPr>
+  </cs:dropLine>
+  <cs:errorBar>
+    <cs:lnRef idx="0"/>
+    <cs:fillRef idx="0"/>
+    <cs:effectRef idx="0"/>
+    <cs:fontRef idx="minor">
+      <a:schemeClr val="tx1"/>
+    </cs:fontRef>
+    <cs:spPr>
+      <a:ln w="9525" cap="flat" cmpd="sng" algn="ctr">
+        <a:solidFill>
+          <a:schemeClr val="tx1">
+            <a:lumMod val="65000"/>
+            <a:lumOff val="35000"/>
+          </a:schemeClr>
+        </a:solidFill>
+        <a:round/>
+      </a:ln>
+    </cs:spPr>
+  </cs:errorBar>
+  <cs:floor>
+    <cs:lnRef idx="0"/>
+    <cs:fillRef idx="0"/>
+    <cs:effectRef idx="0"/>
+    <cs:fontRef idx="minor">
+      <a:schemeClr val="tx1"/>
+    </cs:fontRef>
+    <cs:spPr>
+      <a:noFill/>
+      <a:ln>
+        <a:noFill/>
+      </a:ln>
+    </cs:spPr>
+  </cs:floor>
+  <cs:gridlineMajor>
+    <cs:lnRef idx="0"/>
+    <cs:fillRef idx="0"/>
+    <cs:effectRef idx="0"/>
+    <cs:fontRef idx="minor">
+      <a:schemeClr val="tx1"/>
+    </cs:fontRef>
+    <cs:spPr>
+      <a:ln w="9525" cap="flat" cmpd="sng" algn="ctr">
+        <a:solidFill>
+          <a:schemeClr val="tx1">
+            <a:lumMod val="15000"/>
+            <a:lumOff val="85000"/>
+          </a:schemeClr>
+        </a:solidFill>
+        <a:round/>
+      </a:ln>
+    </cs:spPr>
+  </cs:gridlineMajor>
+  <cs:gridlineMinor>
+    <cs:lnRef idx="0"/>
+    <cs:fillRef idx="0"/>
+    <cs:effectRef idx="0"/>
+    <cs:fontRef idx="minor">
+      <a:schemeClr val="tx1"/>
+    </cs:fontRef>
+    <cs:spPr>
+      <a:ln w="9525" cap="flat" cmpd="sng" algn="ctr">
+        <a:solidFill>
+          <a:schemeClr val="tx1">
+            <a:lumMod val="5000"/>
+            <a:lumOff val="95000"/>
+          </a:schemeClr>
+        </a:solidFill>
+        <a:round/>
+      </a:ln>
+    </cs:spPr>
+  </cs:gridlineMinor>
+  <cs:hiLoLine>
+    <cs:lnRef idx="0"/>
+    <cs:fillRef idx="0"/>
+    <cs:effectRef idx="0"/>
+    <cs:fontRef idx="minor">
+      <a:schemeClr val="tx1"/>
+    </cs:fontRef>
+    <cs:spPr>
+      <a:ln w="9525" cap="flat" cmpd="sng" algn="ctr">
+        <a:solidFill>
+          <a:schemeClr val="tx1">
+            <a:lumMod val="75000"/>
+            <a:lumOff val="25000"/>
+          </a:schemeClr>
+        </a:solidFill>
+        <a:round/>
+      </a:ln>
+    </cs:spPr>
+  </cs:hiLoLine>
+  <cs:leaderLine>
+    <cs:lnRef idx="0"/>
+    <cs:fillRef idx="0"/>
+    <cs:effectRef idx="0"/>
+    <cs:fontRef idx="minor">
+      <a:schemeClr val="tx1"/>
+    </cs:fontRef>
+    <cs:spPr>
+      <a:ln w="9525" cap="flat" cmpd="sng" algn="ctr">
+        <a:solidFill>
+          <a:schemeClr val="tx1">
+            <a:lumMod val="35000"/>
+            <a:lumOff val="65000"/>
+          </a:schemeClr>
+        </a:solidFill>
+        <a:round/>
+      </a:ln>
+    </cs:spPr>
+  </cs:leaderLine>
+  <cs:legend>
+    <cs:lnRef idx="0"/>
+    <cs:fillRef idx="0"/>
+    <cs:effectRef idx="0"/>
+    <cs:fontRef idx="minor">
+      <a:schemeClr val="tx1">
+        <a:lumMod val="65000"/>
+        <a:lumOff val="35000"/>
+      </a:schemeClr>
+    </cs:fontRef>
+    <cs:defRPr sz="900" kern="1200"/>
+  </cs:legend>
+  <cs:plotArea mods="allowNoFillOverride allowNoLineOverride">
+    <cs:lnRef idx="0"/>
+    <cs:fillRef idx="0"/>
+    <cs:effectRef idx="0"/>
+    <cs:fontRef idx="minor">
+      <a:schemeClr val="tx1"/>
+    </cs:fontRef>
+  </cs:plotArea>
+  <cs:plotArea3D mods="allowNoFillOverride allowNoLineOverride">
+    <cs:lnRef idx="0"/>
+    <cs:fillRef idx="0"/>
+    <cs:effectRef idx="0"/>
+    <cs:fontRef idx="minor">
+      <a:schemeClr val="tx1"/>
+    </cs:fontRef>
+  </cs:plotArea3D>
+  <cs:seriesAxis>
+    <cs:lnRef idx="0"/>
+    <cs:fillRef idx="0"/>
+    <cs:effectRef idx="0"/>
+    <cs:fontRef idx="minor">
+      <a:schemeClr val="tx1">
+        <a:lumMod val="65000"/>
+        <a:lumOff val="35000"/>
+      </a:schemeClr>
+    </cs:fontRef>
+    <cs:defRPr sz="900" kern="1200"/>
+  </cs:seriesAxis>
+  <cs:seriesLine>
+    <cs:lnRef idx="0"/>
+    <cs:fillRef idx="0"/>
+    <cs:effectRef idx="0"/>
+    <cs:fontRef idx="minor">
+      <a:schemeClr val="tx1"/>
+    </cs:fontRef>
+    <cs:spPr>
+      <a:ln w="9525" cap="flat" cmpd="sng" algn="ctr">
+        <a:solidFill>
+          <a:schemeClr val="tx1">
+            <a:lumMod val="35000"/>
+            <a:lumOff val="65000"/>
+          </a:schemeClr>
+        </a:solidFill>
+        <a:round/>
+      </a:ln>
+    </cs:spPr>
+  </cs:seriesLine>
+  <cs:title>
+    <cs:lnRef idx="0"/>
+    <cs:fillRef idx="0"/>
+    <cs:effectRef idx="0"/>
+    <cs:fontRef idx="minor">
+      <a:schemeClr val="tx1">
+        <a:lumMod val="65000"/>
+        <a:lumOff val="35000"/>
+      </a:schemeClr>
+    </cs:fontRef>
+    <cs:defRPr sz="1400" b="0" kern="1200" spc="0" baseline="0"/>
+  </cs:title>
+  <cs:trendline>
+    <cs:lnRef idx="0">
+      <cs:styleClr val="auto"/>
+    </cs:lnRef>
+    <cs:fillRef idx="0"/>
+    <cs:effectRef idx="0"/>
+    <cs:fontRef idx="minor">
+      <a:schemeClr val="tx1"/>
+    </cs:fontRef>
+    <cs:spPr>
+      <a:ln w="19050" cap="rnd">
+        <a:solidFill>
+          <a:schemeClr val="phClr"/>
+        </a:solidFill>
+        <a:prstDash val="sysDot"/>
+      </a:ln>
+    </cs:spPr>
+  </cs:trendline>
+  <cs:trendlineLabel>
+    <cs:lnRef idx="0"/>
+    <cs:fillRef idx="0"/>
+    <cs:effectRef idx="0"/>
+    <cs:fontRef idx="minor">
+      <a:schemeClr val="tx1">
+        <a:lumMod val="65000"/>
+        <a:lumOff val="35000"/>
+      </a:schemeClr>
+    </cs:fontRef>
+    <cs:defRPr sz="900" kern="1200"/>
+  </cs:trendlineLabel>
+  <cs:upBar>
+    <cs:lnRef idx="0"/>
+    <cs:fillRef idx="0"/>
+    <cs:effectRef idx="0"/>
+    <cs:fontRef idx="minor">
+      <a:schemeClr val="dk1"/>
+    </cs:fontRef>
+    <cs:spPr>
+      <a:solidFill>
+        <a:schemeClr val="lt1"/>
+      </a:solidFill>
+      <a:ln w="9525">
+        <a:solidFill>
+          <a:schemeClr val="tx1">
+            <a:lumMod val="15000"/>
+            <a:lumOff val="85000"/>
+          </a:schemeClr>
+        </a:solidFill>
+      </a:ln>
+    </cs:spPr>
+  </cs:upBar>
+  <cs:valueAxis>
+    <cs:lnRef idx="0"/>
+    <cs:fillRef idx="0"/>
+    <cs:effectRef idx="0"/>
+    <cs:fontRef idx="minor">
+      <a:schemeClr val="tx1">
+        <a:lumMod val="65000"/>
+        <a:lumOff val="35000"/>
+      </a:schemeClr>
+    </cs:fontRef>
+    <cs:defRPr sz="900" kern="1200"/>
+  </cs:valueAxis>
+  <cs:wall>
+    <cs:lnRef idx="0"/>
+    <cs:fillRef idx="0"/>
+    <cs:effectRef idx="0"/>
+    <cs:fontRef idx="minor">
+      <a:schemeClr val="tx1"/>
+    </cs:fontRef>
+    <cs:spPr>
+      <a:noFill/>
+      <a:ln>
+        <a:noFill/>
+      </a:ln>
+    </cs:spPr>
+  </cs:wall>
+</cs:chartStyle>
 </file>
 
 <file path=ppt/notesMasters/notesMaster1.xml><?xml version="1.0" encoding="utf-8"?>
@@ -207,7 +1059,7 @@
           <a:p>
             <a:fld id="{7DD38B49-C3A7-4F4D-B948-B07A2A443D7A}" type="datetimeFigureOut">
               <a:rPr lang="en-GB" smtClean="0"/>
-              <a:t>10/12/2016</a:t>
+              <a:t>12/12/2016</a:t>
             </a:fld>
             <a:endParaRPr lang="en-GB"/>
           </a:p>
@@ -908,7 +1760,7 @@
           <a:p>
             <a:fld id="{4FDE41E5-6907-4888-9EF3-757503DFA36A}" type="slidenum">
               <a:rPr lang="en-GB" smtClean="0"/>
-              <a:t>13</a:t>
+              <a:t>14</a:t>
             </a:fld>
             <a:endParaRPr lang="en-GB"/>
           </a:p>
@@ -1893,7 +2745,7 @@
           <a:p>
             <a:fld id="{6D98DDBC-8602-40B9-B075-C33FCB63C9F2}" type="datetimeFigureOut">
               <a:rPr lang="en-GB" smtClean="0"/>
-              <a:t>10/12/2016</a:t>
+              <a:t>12/12/2016</a:t>
             </a:fld>
             <a:endParaRPr lang="en-GB"/>
           </a:p>
@@ -2101,7 +2953,7 @@
           <a:p>
             <a:fld id="{6D98DDBC-8602-40B9-B075-C33FCB63C9F2}" type="datetimeFigureOut">
               <a:rPr lang="en-GB" smtClean="0"/>
-              <a:t>10/12/2016</a:t>
+              <a:t>12/12/2016</a:t>
             </a:fld>
             <a:endParaRPr lang="en-GB"/>
           </a:p>
@@ -2357,7 +3209,7 @@
           <a:p>
             <a:fld id="{6D98DDBC-8602-40B9-B075-C33FCB63C9F2}" type="datetimeFigureOut">
               <a:rPr lang="en-GB" smtClean="0"/>
-              <a:t>10/12/2016</a:t>
+              <a:t>12/12/2016</a:t>
             </a:fld>
             <a:endParaRPr lang="en-GB"/>
           </a:p>
@@ -2531,7 +3383,7 @@
           <a:p>
             <a:fld id="{6D98DDBC-8602-40B9-B075-C33FCB63C9F2}" type="datetimeFigureOut">
               <a:rPr lang="en-GB" smtClean="0"/>
-              <a:t>10/12/2016</a:t>
+              <a:t>12/12/2016</a:t>
             </a:fld>
             <a:endParaRPr lang="en-GB"/>
           </a:p>
@@ -2874,7 +3726,7 @@
           <a:p>
             <a:fld id="{6D98DDBC-8602-40B9-B075-C33FCB63C9F2}" type="datetimeFigureOut">
               <a:rPr lang="en-GB" smtClean="0"/>
-              <a:t>10/12/2016</a:t>
+              <a:t>12/12/2016</a:t>
             </a:fld>
             <a:endParaRPr lang="en-GB"/>
           </a:p>
@@ -3149,7 +4001,7 @@
           <a:p>
             <a:fld id="{6D98DDBC-8602-40B9-B075-C33FCB63C9F2}" type="datetimeFigureOut">
               <a:rPr lang="en-GB" smtClean="0"/>
-              <a:t>10/12/2016</a:t>
+              <a:t>12/12/2016</a:t>
             </a:fld>
             <a:endParaRPr lang="en-GB"/>
           </a:p>
@@ -3528,7 +4380,7 @@
           <a:p>
             <a:fld id="{6D98DDBC-8602-40B9-B075-C33FCB63C9F2}" type="datetimeFigureOut">
               <a:rPr lang="en-GB" smtClean="0"/>
-              <a:t>10/12/2016</a:t>
+              <a:t>12/12/2016</a:t>
             </a:fld>
             <a:endParaRPr lang="en-GB"/>
           </a:p>
@@ -3646,7 +4498,7 @@
           <a:p>
             <a:fld id="{6D98DDBC-8602-40B9-B075-C33FCB63C9F2}" type="datetimeFigureOut">
               <a:rPr lang="en-GB" smtClean="0"/>
-              <a:t>10/12/2016</a:t>
+              <a:t>12/12/2016</a:t>
             </a:fld>
             <a:endParaRPr lang="en-GB"/>
           </a:p>
@@ -3817,7 +4669,7 @@
           <a:p>
             <a:fld id="{6D98DDBC-8602-40B9-B075-C33FCB63C9F2}" type="datetimeFigureOut">
               <a:rPr lang="en-GB" smtClean="0"/>
-              <a:t>10/12/2016</a:t>
+              <a:t>12/12/2016</a:t>
             </a:fld>
             <a:endParaRPr lang="en-GB"/>
           </a:p>
@@ -4171,7 +5023,7 @@
           <a:p>
             <a:fld id="{6D98DDBC-8602-40B9-B075-C33FCB63C9F2}" type="datetimeFigureOut">
               <a:rPr lang="en-GB" smtClean="0"/>
-              <a:t>10/12/2016</a:t>
+              <a:t>12/12/2016</a:t>
             </a:fld>
             <a:endParaRPr lang="en-GB"/>
           </a:p>
@@ -4553,7 +5405,7 @@
           <a:p>
             <a:fld id="{6D98DDBC-8602-40B9-B075-C33FCB63C9F2}" type="datetimeFigureOut">
               <a:rPr lang="en-GB" smtClean="0"/>
-              <a:t>10/12/2016</a:t>
+              <a:t>12/12/2016</a:t>
             </a:fld>
             <a:endParaRPr lang="en-GB"/>
           </a:p>
@@ -4840,7 +5692,7 @@
           <a:p>
             <a:fld id="{6D98DDBC-8602-40B9-B075-C33FCB63C9F2}" type="datetimeFigureOut">
               <a:rPr lang="en-GB" smtClean="0"/>
-              <a:t>10/12/2016</a:t>
+              <a:t>12/12/2016</a:t>
             </a:fld>
             <a:endParaRPr lang="en-GB"/>
           </a:p>
@@ -5411,11 +6263,7 @@
           <a:p>
             <a:r>
               <a:rPr lang="en-GB" dirty="0"/>
-              <a:t>Jake Seaman,</a:t>
-            </a:r>
-            <a:r>
-              <a:rPr lang="en-GB" dirty="0"/>
-              <a:t> Macaulay Mills, Callum Walsh and Connor </a:t>
+              <a:t>Jake Seaman, Macaulay Mills, Callum Walsh and Connor </a:t>
             </a:r>
             <a:r>
               <a:rPr lang="en-GB" dirty="0" err="1"/>
@@ -5507,7 +6355,7 @@
             </a:pPr>
             <a:r>
               <a:rPr lang="en-GB" dirty="0"/>
-              <a:t>The player will be rewards with a hint to the games narrative. </a:t>
+              <a:t>The player will be rewarded with a hint to the games narrative. </a:t>
             </a:r>
           </a:p>
           <a:p>
@@ -5516,7 +6364,7 @@
             </a:pPr>
             <a:r>
               <a:rPr lang="en-GB" dirty="0"/>
-              <a:t>-  The email notifications being the rewarding hint. </a:t>
+              <a:t>-  Using email notifications as the rewarding hint. </a:t>
             </a:r>
           </a:p>
         </p:txBody>
@@ -5876,36 +6724,40 @@
           <a:bodyPr/>
           <a:lstStyle/>
           <a:p>
-            <a:r>
-              <a:rPr lang="en-GB" dirty="0"/>
-              <a:t>What we could of done better	</a:t>
-            </a:r>
-          </a:p>
-        </p:txBody>
-      </p:sp>
-      <p:sp>
-        <p:nvSpPr>
-          <p:cNvPr id="3" name="Content Placeholder 2"/>
-          <p:cNvSpPr>
-            <a:spLocks noGrp="1"/>
-          </p:cNvSpPr>
-          <p:nvPr>
-            <p:ph idx="1"/>
-          </p:nvPr>
-        </p:nvSpPr>
-        <p:spPr/>
-        <p:txBody>
-          <a:bodyPr/>
-          <a:lstStyle/>
-          <a:p>
             <a:endParaRPr lang="en-GB"/>
           </a:p>
         </p:txBody>
       </p:sp>
+      <p:graphicFrame>
+        <p:nvGraphicFramePr>
+          <p:cNvPr id="4" name="Chart 3">
+            <a:extLst/>
+          </p:cNvPr>
+          <p:cNvGraphicFramePr>
+            <a:graphicFrameLocks/>
+          </p:cNvGraphicFramePr>
+          <p:nvPr>
+            <p:extLst>
+              <p:ext uri="{D42A27DB-BD31-4B8C-83A1-F6EECF244321}">
+                <p14:modId xmlns:p14="http://schemas.microsoft.com/office/powerpoint/2010/main" val="3124474542"/>
+              </p:ext>
+            </p:extLst>
+          </p:nvPr>
+        </p:nvGraphicFramePr>
+        <p:xfrm>
+          <a:off x="2878397" y="1859288"/>
+          <a:ext cx="6496165" cy="3897699"/>
+        </p:xfrm>
+        <a:graphic>
+          <a:graphicData uri="http://schemas.openxmlformats.org/drawingml/2006/chart">
+            <c:chart xmlns:c="http://schemas.openxmlformats.org/drawingml/2006/chart" xmlns:r="http://schemas.openxmlformats.org/officeDocument/2006/relationships" r:id="rId2"/>
+          </a:graphicData>
+        </a:graphic>
+      </p:graphicFrame>
     </p:spTree>
     <p:extLst>
       <p:ext uri="{BB962C8B-B14F-4D97-AF65-F5344CB8AC3E}">
-        <p14:creationId xmlns:p14="http://schemas.microsoft.com/office/powerpoint/2010/main" val="2607490231"/>
+        <p14:creationId xmlns:p14="http://schemas.microsoft.com/office/powerpoint/2010/main" val="1070995597"/>
       </p:ext>
     </p:extLst>
   </p:cSld>
@@ -5949,7 +6801,7 @@
           <a:p>
             <a:r>
               <a:rPr lang="en-GB" dirty="0"/>
-              <a:t>What we did well </a:t>
+              <a:t>What we could have done better	</a:t>
             </a:r>
           </a:p>
         </p:txBody>
@@ -5969,14 +6821,26 @@
           <a:bodyPr/>
           <a:lstStyle/>
           <a:p>
-            <a:endParaRPr lang="en-GB"/>
+            <a:r>
+              <a:rPr lang="en-GB" dirty="0"/>
+              <a:t>Added challenge to our game</a:t>
+            </a:r>
+          </a:p>
+          <a:p>
+            <a:r>
+              <a:rPr lang="en-GB" dirty="0"/>
+              <a:t>Included more story elements in our game.</a:t>
+            </a:r>
+          </a:p>
+          <a:p>
+            <a:endParaRPr lang="en-GB" dirty="0"/>
           </a:p>
         </p:txBody>
       </p:sp>
     </p:spTree>
     <p:extLst>
       <p:ext uri="{BB962C8B-B14F-4D97-AF65-F5344CB8AC3E}">
-        <p14:creationId xmlns:p14="http://schemas.microsoft.com/office/powerpoint/2010/main" val="617682262"/>
+        <p14:creationId xmlns:p14="http://schemas.microsoft.com/office/powerpoint/2010/main" val="2607490231"/>
       </p:ext>
     </p:extLst>
   </p:cSld>
@@ -6020,7 +6884,7 @@
           <a:p>
             <a:r>
               <a:rPr lang="en-GB" dirty="0"/>
-              <a:t>What we would of liked to add </a:t>
+              <a:t>What we did well </a:t>
             </a:r>
           </a:p>
         </p:txBody>
@@ -6040,14 +6904,32 @@
           <a:bodyPr/>
           <a:lstStyle/>
           <a:p>
-            <a:endParaRPr lang="en-GB"/>
+            <a:r>
+              <a:rPr lang="en-GB" dirty="0"/>
+              <a:t>The game works well and is bug free</a:t>
+            </a:r>
+          </a:p>
+          <a:p>
+            <a:r>
+              <a:rPr lang="en-GB" dirty="0"/>
+              <a:t>There are multiple levels with increasing complexity</a:t>
+            </a:r>
+          </a:p>
+          <a:p>
+            <a:r>
+              <a:rPr lang="en-GB" dirty="0"/>
+              <a:t>The team worked well together to create this game</a:t>
+            </a:r>
+          </a:p>
+          <a:p>
+            <a:endParaRPr lang="en-GB" dirty="0"/>
           </a:p>
         </p:txBody>
       </p:sp>
     </p:spTree>
     <p:extLst>
       <p:ext uri="{BB962C8B-B14F-4D97-AF65-F5344CB8AC3E}">
-        <p14:creationId xmlns:p14="http://schemas.microsoft.com/office/powerpoint/2010/main" val="1962290326"/>
+        <p14:creationId xmlns:p14="http://schemas.microsoft.com/office/powerpoint/2010/main" val="617682262"/>
       </p:ext>
     </p:extLst>
   </p:cSld>
@@ -6542,15 +7424,7 @@
             </a:pPr>
             <a:r>
               <a:rPr lang="en-GB" dirty="0"/>
-              <a:t>   - </a:t>
-            </a:r>
-            <a:r>
-              <a:rPr lang="en-GB" dirty="0"/>
-              <a:t>desura.com </a:t>
-            </a:r>
-            <a:r>
-              <a:rPr lang="en-GB" dirty="0"/>
-              <a:t> </a:t>
+              <a:t>   - desura.com  </a:t>
             </a:r>
           </a:p>
         </p:txBody>
@@ -7529,7 +8403,7 @@
             <a:pPr lvl="1"/>
             <a:r>
               <a:rPr lang="en-US" dirty="0"/>
-              <a:t>An experience a sense of easy and serious fun</a:t>
+              <a:t>And a sense of easy and serious fun</a:t>
             </a:r>
             <a:endParaRPr lang="en-GB" dirty="0"/>
           </a:p>

</xml_diff>